<commit_message>
Updated images to use AWS ECR Public
</commit_message>
<xml_diff>
--- a/rvstore_hackathon/K8s-RV Store Hackathon.pptx
+++ b/rvstore_hackathon/K8s-RV Store Hackathon.pptx
@@ -476,7 +476,7 @@
           <a:p>
             <a:fld id="{52C7B5E8-5650-4264-A661-2CC42BB409CD}" type="datetimeFigureOut">
               <a:rPr lang="en-US" smtClean="0"/>
-              <a:t>10/31/20</a:t>
+              <a:t>12/1/20</a:t>
             </a:fld>
             <a:endParaRPr lang="en-US"/>
           </a:p>
@@ -2915,7 +2915,7 @@
                 </a:solidFill>
                 <a:latin typeface="Raleway Medium" panose="020B0603030101060003" pitchFamily="34" charset="77"/>
               </a:rPr>
-              <a:t>vergeops</a:t>
+              <a:t>public.ecr.aws</a:t>
             </a:r>
             <a:r>
               <a:rPr lang="en-US" sz="2400" dirty="0">
@@ -2924,7 +2924,43 @@
                 </a:solidFill>
                 <a:latin typeface="Raleway Medium" panose="020B0603030101060003" pitchFamily="34" charset="77"/>
               </a:rPr>
-              <a:t>/k8s-rvstore-product-api </a:t>
+              <a:t>/e7e6w2e3/</a:t>
+            </a:r>
+            <a:r>
+              <a:rPr lang="en-US" sz="2400" dirty="0" err="1">
+                <a:solidFill>
+                  <a:schemeClr val="bg1"/>
+                </a:solidFill>
+                <a:latin typeface="Raleway Medium" panose="020B0603030101060003" pitchFamily="34" charset="77"/>
+              </a:rPr>
+              <a:t>rvstore</a:t>
+            </a:r>
+            <a:r>
+              <a:rPr lang="en-US" sz="2400" dirty="0">
+                <a:solidFill>
+                  <a:schemeClr val="bg1"/>
+                </a:solidFill>
+                <a:latin typeface="Raleway Medium" panose="020B0603030101060003" pitchFamily="34" charset="77"/>
+              </a:rPr>
+              <a:t>-product-</a:t>
+            </a:r>
+            <a:r>
+              <a:rPr lang="en-US" sz="2400" dirty="0" err="1">
+                <a:solidFill>
+                  <a:schemeClr val="bg1"/>
+                </a:solidFill>
+                <a:latin typeface="Raleway Medium" panose="020B0603030101060003" pitchFamily="34" charset="77"/>
+              </a:rPr>
+              <a:t>api</a:t>
+            </a:r>
+            <a:r>
+              <a:rPr lang="en-US" sz="2400" dirty="0">
+                <a:solidFill>
+                  <a:schemeClr val="bg1"/>
+                </a:solidFill>
+                <a:latin typeface="Raleway Medium" panose="020B0603030101060003" pitchFamily="34" charset="77"/>
+              </a:rPr>
+              <a:t> </a:t>
             </a:r>
           </a:p>
           <a:p>
@@ -3613,7 +3649,7 @@
                 </a:solidFill>
                 <a:latin typeface="Raleway Medium" panose="020B0603030101060003" pitchFamily="34" charset="77"/>
               </a:rPr>
-              <a:t>vergeops</a:t>
+              <a:t>public.ecr.aws</a:t>
             </a:r>
             <a:r>
               <a:rPr lang="en-US" sz="2400" dirty="0">
@@ -3622,7 +3658,43 @@
                 </a:solidFill>
                 <a:latin typeface="Raleway Medium" panose="020B0603030101060003" pitchFamily="34" charset="77"/>
               </a:rPr>
-              <a:t>/k8s-rvstore-auth-api </a:t>
+              <a:t>/e7e6w2e3/</a:t>
+            </a:r>
+            <a:r>
+              <a:rPr lang="en-US" sz="2400" dirty="0" err="1">
+                <a:solidFill>
+                  <a:schemeClr val="bg1"/>
+                </a:solidFill>
+                <a:latin typeface="Raleway Medium" panose="020B0603030101060003" pitchFamily="34" charset="77"/>
+              </a:rPr>
+              <a:t>rvstore</a:t>
+            </a:r>
+            <a:r>
+              <a:rPr lang="en-US" sz="2400" dirty="0">
+                <a:solidFill>
+                  <a:schemeClr val="bg1"/>
+                </a:solidFill>
+                <a:latin typeface="Raleway Medium" panose="020B0603030101060003" pitchFamily="34" charset="77"/>
+              </a:rPr>
+              <a:t>-auth-</a:t>
+            </a:r>
+            <a:r>
+              <a:rPr lang="en-US" sz="2400" dirty="0" err="1">
+                <a:solidFill>
+                  <a:schemeClr val="bg1"/>
+                </a:solidFill>
+                <a:latin typeface="Raleway Medium" panose="020B0603030101060003" pitchFamily="34" charset="77"/>
+              </a:rPr>
+              <a:t>api</a:t>
+            </a:r>
+            <a:r>
+              <a:rPr lang="en-US" sz="2400" dirty="0">
+                <a:solidFill>
+                  <a:schemeClr val="bg1"/>
+                </a:solidFill>
+                <a:latin typeface="Raleway Medium" panose="020B0603030101060003" pitchFamily="34" charset="77"/>
+              </a:rPr>
+              <a:t> </a:t>
             </a:r>
           </a:p>
           <a:p>
@@ -4209,7 +4281,7 @@
                 </a:solidFill>
                 <a:latin typeface="Raleway Medium" panose="020B0603030101060003" pitchFamily="34" charset="77"/>
               </a:rPr>
-              <a:t>vergeops</a:t>
+              <a:t>public.ecr.aws</a:t>
             </a:r>
             <a:r>
               <a:rPr lang="en-US" sz="2400" dirty="0">
@@ -4218,7 +4290,43 @@
                 </a:solidFill>
                 <a:latin typeface="Raleway Medium" panose="020B0603030101060003" pitchFamily="34" charset="77"/>
               </a:rPr>
-              <a:t>/k8s-rvstore-order-api </a:t>
+              <a:t>/e7e6w2e3/</a:t>
+            </a:r>
+            <a:r>
+              <a:rPr lang="en-US" sz="2400" dirty="0" err="1">
+                <a:solidFill>
+                  <a:schemeClr val="bg1"/>
+                </a:solidFill>
+                <a:latin typeface="Raleway Medium" panose="020B0603030101060003" pitchFamily="34" charset="77"/>
+              </a:rPr>
+              <a:t>rvstore</a:t>
+            </a:r>
+            <a:r>
+              <a:rPr lang="en-US" sz="2400" dirty="0">
+                <a:solidFill>
+                  <a:schemeClr val="bg1"/>
+                </a:solidFill>
+                <a:latin typeface="Raleway Medium" panose="020B0603030101060003" pitchFamily="34" charset="77"/>
+              </a:rPr>
+              <a:t>-order-</a:t>
+            </a:r>
+            <a:r>
+              <a:rPr lang="en-US" sz="2400" dirty="0" err="1">
+                <a:solidFill>
+                  <a:schemeClr val="bg1"/>
+                </a:solidFill>
+                <a:latin typeface="Raleway Medium" panose="020B0603030101060003" pitchFamily="34" charset="77"/>
+              </a:rPr>
+              <a:t>api</a:t>
+            </a:r>
+            <a:r>
+              <a:rPr lang="en-US" sz="2400" dirty="0">
+                <a:solidFill>
+                  <a:schemeClr val="bg1"/>
+                </a:solidFill>
+                <a:latin typeface="Raleway Medium" panose="020B0603030101060003" pitchFamily="34" charset="77"/>
+              </a:rPr>
+              <a:t> </a:t>
             </a:r>
           </a:p>
           <a:p>
@@ -4718,7 +4826,7 @@
         <p:spPr>
           <a:xfrm>
             <a:off x="1311897" y="1168924"/>
-            <a:ext cx="9398524" cy="6032421"/>
+            <a:ext cx="9398524" cy="6401753"/>
           </a:xfrm>
           <a:prstGeom prst="rect">
             <a:avLst/>
@@ -4811,7 +4919,7 @@
                 </a:solidFill>
                 <a:latin typeface="Raleway Medium" panose="020B0603030101060003" pitchFamily="34" charset="77"/>
               </a:rPr>
-              <a:t>vergeops</a:t>
+              <a:t>public.ecr.aws</a:t>
             </a:r>
             <a:r>
               <a:rPr lang="en-US" sz="2400" dirty="0">
@@ -4820,7 +4928,25 @@
                 </a:solidFill>
                 <a:latin typeface="Raleway Medium" panose="020B0603030101060003" pitchFamily="34" charset="77"/>
               </a:rPr>
-              <a:t>/k8s-rvstore-order-simulator</a:t>
+              <a:t>/e7e6w2e3/</a:t>
+            </a:r>
+            <a:r>
+              <a:rPr lang="en-US" sz="2400" dirty="0" err="1">
+                <a:solidFill>
+                  <a:schemeClr val="bg1"/>
+                </a:solidFill>
+                <a:latin typeface="Raleway Medium" panose="020B0603030101060003" pitchFamily="34" charset="77"/>
+              </a:rPr>
+              <a:t>rvstore</a:t>
+            </a:r>
+            <a:r>
+              <a:rPr lang="en-US" sz="2400" dirty="0">
+                <a:solidFill>
+                  <a:schemeClr val="bg1"/>
+                </a:solidFill>
+                <a:latin typeface="Raleway Medium" panose="020B0603030101060003" pitchFamily="34" charset="77"/>
+              </a:rPr>
+              <a:t>-order-simulator</a:t>
             </a:r>
           </a:p>
           <a:p>
@@ -5289,7 +5415,7 @@
         <p:spPr>
           <a:xfrm>
             <a:off x="1311897" y="1168924"/>
-            <a:ext cx="9398524" cy="7879080"/>
+            <a:ext cx="9398524" cy="8248412"/>
           </a:xfrm>
           <a:prstGeom prst="rect">
             <a:avLst/>
@@ -5445,7 +5571,7 @@
                 </a:solidFill>
                 <a:latin typeface="Raleway Medium" panose="020B0603030101060003" pitchFamily="34" charset="77"/>
               </a:rPr>
-              <a:t>vergeops</a:t>
+              <a:t>public.ecr.aws</a:t>
             </a:r>
             <a:r>
               <a:rPr lang="en-US" sz="2400" dirty="0">
@@ -5454,7 +5580,25 @@
                 </a:solidFill>
                 <a:latin typeface="Raleway Medium" panose="020B0603030101060003" pitchFamily="34" charset="77"/>
               </a:rPr>
-              <a:t>/k8s-rvstore-api-gateway</a:t>
+              <a:t>/e7e6w2e3/</a:t>
+            </a:r>
+            <a:r>
+              <a:rPr lang="en-US" sz="2400" dirty="0" err="1">
+                <a:solidFill>
+                  <a:schemeClr val="bg1"/>
+                </a:solidFill>
+                <a:latin typeface="Raleway Medium" panose="020B0603030101060003" pitchFamily="34" charset="77"/>
+              </a:rPr>
+              <a:t>rvstore</a:t>
+            </a:r>
+            <a:r>
+              <a:rPr lang="en-US" sz="2400" dirty="0">
+                <a:solidFill>
+                  <a:schemeClr val="bg1"/>
+                </a:solidFill>
+                <a:latin typeface="Raleway Medium" panose="020B0603030101060003" pitchFamily="34" charset="77"/>
+              </a:rPr>
+              <a:t>-gateway-service</a:t>
             </a:r>
           </a:p>
           <a:p>
@@ -5979,7 +6123,34 @@
                 </a:solidFill>
                 <a:latin typeface="Raleway Medium" panose="020B0603030101060003" pitchFamily="34" charset="77"/>
               </a:rPr>
-              <a:t>mongo:latest</a:t>
+              <a:t>public.ecr.aws</a:t>
+            </a:r>
+            <a:r>
+              <a:rPr lang="en-US" sz="2400" dirty="0">
+                <a:solidFill>
+                  <a:schemeClr val="bg1"/>
+                </a:solidFill>
+                <a:latin typeface="Raleway Medium" panose="020B0603030101060003" pitchFamily="34" charset="77"/>
+              </a:rPr>
+              <a:t>/e7e6w2e3/</a:t>
+            </a:r>
+            <a:r>
+              <a:rPr lang="en-US" sz="2400" dirty="0" err="1">
+                <a:solidFill>
+                  <a:schemeClr val="bg1"/>
+                </a:solidFill>
+                <a:latin typeface="Raleway Medium" panose="020B0603030101060003" pitchFamily="34" charset="77"/>
+              </a:rPr>
+              <a:t>rvstore</a:t>
+            </a:r>
+            <a:r>
+              <a:rPr lang="en-US" sz="2400">
+                <a:solidFill>
+                  <a:schemeClr val="bg1"/>
+                </a:solidFill>
+                <a:latin typeface="Raleway Medium" panose="020B0603030101060003" pitchFamily="34" charset="77"/>
+              </a:rPr>
+              <a:t>-mongo</a:t>
             </a:r>
             <a:endParaRPr lang="en-US" sz="2400" dirty="0">
               <a:solidFill>
@@ -11870,7 +12041,7 @@
                 </a:solidFill>
                 <a:latin typeface="Raleway Medium" panose="020B0603030101060003" pitchFamily="34" charset="77"/>
               </a:rPr>
-              <a:t>vergeops</a:t>
+              <a:t>public.ecr.aws</a:t>
             </a:r>
             <a:r>
               <a:rPr lang="en-US" sz="2400" dirty="0">
@@ -11879,8 +12050,23 @@
                 </a:solidFill>
                 <a:latin typeface="Raleway Medium" panose="020B0603030101060003" pitchFamily="34" charset="77"/>
               </a:rPr>
-              <a:t>/k8s-rvstore-ui</a:t>
-            </a:r>
+              <a:t>/e7e6w2e3/</a:t>
+            </a:r>
+            <a:r>
+              <a:rPr lang="en-US" sz="2400" dirty="0" err="1">
+                <a:solidFill>
+                  <a:schemeClr val="bg1"/>
+                </a:solidFill>
+                <a:latin typeface="Raleway Medium" panose="020B0603030101060003" pitchFamily="34" charset="77"/>
+              </a:rPr>
+              <a:t>rvstore-ui</a:t>
+            </a:r>
+            <a:endParaRPr lang="en-US" sz="2400" dirty="0">
+              <a:solidFill>
+                <a:schemeClr val="bg1"/>
+              </a:solidFill>
+              <a:latin typeface="Raleway Medium" panose="020B0603030101060003" pitchFamily="34" charset="77"/>
+            </a:endParaRPr>
           </a:p>
           <a:p>
             <a:pPr marL="342900" indent="-342900">

</xml_diff>

<commit_message>
Updated hackathon slide deck
</commit_message>
<xml_diff>
--- a/rvstore_hackathon/K8s-RV Store Hackathon.pptx
+++ b/rvstore_hackathon/K8s-RV Store Hackathon.pptx
@@ -476,7 +476,7 @@
           <a:p>
             <a:fld id="{52C7B5E8-5650-4264-A661-2CC42BB409CD}" type="datetimeFigureOut">
               <a:rPr lang="en-US" smtClean="0"/>
-              <a:t>12/1/20</a:t>
+              <a:t>3/11/21</a:t>
             </a:fld>
             <a:endParaRPr lang="en-US"/>
           </a:p>
@@ -5415,7 +5415,7 @@
         <p:spPr>
           <a:xfrm>
             <a:off x="1311897" y="1168924"/>
-            <a:ext cx="9398524" cy="8248412"/>
+            <a:ext cx="9398524" cy="6401753"/>
           </a:xfrm>
           <a:prstGeom prst="rect">
             <a:avLst/>
@@ -5433,7 +5433,7 @@
               <a:buChar char="•"/>
             </a:pPr>
             <a:r>
-              <a:rPr lang="en-US" sz="2400" dirty="0">
+              <a:rPr lang="en-US" sz="2000" dirty="0">
                 <a:solidFill>
                   <a:schemeClr val="bg1"/>
                 </a:solidFill>
@@ -5442,7 +5442,7 @@
               <a:t>This is a Java Spring Boot application. It routes traffic to the appropriate application based on the path. It acts as traffic cop. For example, </a:t>
             </a:r>
             <a:r>
-              <a:rPr lang="en-US" sz="2400" dirty="0" err="1">
+              <a:rPr lang="en-US" sz="2000" dirty="0" err="1">
                 <a:solidFill>
                   <a:schemeClr val="bg1"/>
                 </a:solidFill>
@@ -5451,7 +5451,7 @@
               <a:t>xyz.com</a:t>
             </a:r>
             <a:r>
-              <a:rPr lang="en-US" sz="2400" dirty="0">
+              <a:rPr lang="en-US" sz="2000" dirty="0">
                 <a:solidFill>
                   <a:schemeClr val="bg1"/>
                 </a:solidFill>
@@ -5466,7 +5466,7 @@
               <a:buChar char="•"/>
             </a:pPr>
             <a:r>
-              <a:rPr lang="en-US" sz="2400" dirty="0">
+              <a:rPr lang="en-US" sz="2000" dirty="0">
                 <a:solidFill>
                   <a:schemeClr val="bg1"/>
                 </a:solidFill>
@@ -5481,7 +5481,7 @@
               <a:buChar char="•"/>
             </a:pPr>
             <a:r>
-              <a:rPr lang="en-US" sz="2400" dirty="0">
+              <a:rPr lang="en-US" sz="2000" dirty="0">
                 <a:solidFill>
                   <a:schemeClr val="bg1"/>
                 </a:solidFill>
@@ -5496,7 +5496,7 @@
               <a:buChar char="•"/>
             </a:pPr>
             <a:r>
-              <a:rPr lang="en-US" sz="2400" dirty="0">
+              <a:rPr lang="en-US" sz="2000" dirty="0">
                 <a:solidFill>
                   <a:schemeClr val="bg1"/>
                 </a:solidFill>
@@ -5511,7 +5511,7 @@
               <a:buChar char="•"/>
             </a:pPr>
             <a:r>
-              <a:rPr lang="en-US" sz="2400" dirty="0">
+              <a:rPr lang="en-US" sz="2000" dirty="0">
                 <a:solidFill>
                   <a:schemeClr val="bg1"/>
                 </a:solidFill>
@@ -5526,7 +5526,7 @@
               <a:buChar char="•"/>
             </a:pPr>
             <a:r>
-              <a:rPr lang="en-US" sz="2400" dirty="0">
+              <a:rPr lang="en-US" sz="2000" dirty="0">
                 <a:solidFill>
                   <a:schemeClr val="bg1"/>
                 </a:solidFill>
@@ -5541,7 +5541,7 @@
               <a:buChar char="•"/>
             </a:pPr>
             <a:r>
-              <a:rPr lang="en-US" sz="2400" dirty="0">
+              <a:rPr lang="en-US" sz="2000" dirty="0">
                 <a:solidFill>
                   <a:schemeClr val="bg1"/>
                 </a:solidFill>
@@ -5556,7 +5556,7 @@
               <a:buChar char="•"/>
             </a:pPr>
             <a:r>
-              <a:rPr lang="en-US" sz="2400" dirty="0">
+              <a:rPr lang="en-US" sz="2000" dirty="0">
                 <a:solidFill>
                   <a:schemeClr val="bg1"/>
                 </a:solidFill>
@@ -5565,7 +5565,7 @@
               <a:t>Docker image: </a:t>
             </a:r>
             <a:r>
-              <a:rPr lang="en-US" sz="2400" dirty="0" err="1">
+              <a:rPr lang="en-US" sz="2000" dirty="0" err="1">
                 <a:solidFill>
                   <a:schemeClr val="bg1"/>
                 </a:solidFill>
@@ -5574,7 +5574,7 @@
               <a:t>public.ecr.aws</a:t>
             </a:r>
             <a:r>
-              <a:rPr lang="en-US" sz="2400" dirty="0">
+              <a:rPr lang="en-US" sz="2000" dirty="0">
                 <a:solidFill>
                   <a:schemeClr val="bg1"/>
                 </a:solidFill>
@@ -5583,7 +5583,7 @@
               <a:t>/e7e6w2e3/</a:t>
             </a:r>
             <a:r>
-              <a:rPr lang="en-US" sz="2400" dirty="0" err="1">
+              <a:rPr lang="en-US" sz="2000" dirty="0" err="1">
                 <a:solidFill>
                   <a:schemeClr val="bg1"/>
                 </a:solidFill>
@@ -5592,7 +5592,7 @@
               <a:t>rvstore</a:t>
             </a:r>
             <a:r>
-              <a:rPr lang="en-US" sz="2400" dirty="0">
+              <a:rPr lang="en-US" sz="2000" dirty="0">
                 <a:solidFill>
                   <a:schemeClr val="bg1"/>
                 </a:solidFill>
@@ -5607,7 +5607,7 @@
               <a:buChar char="•"/>
             </a:pPr>
             <a:r>
-              <a:rPr lang="en-US" sz="2400" dirty="0">
+              <a:rPr lang="en-US" sz="2000" dirty="0">
                 <a:solidFill>
                   <a:schemeClr val="bg1"/>
                 </a:solidFill>
@@ -5622,7 +5622,7 @@
               <a:buChar char="•"/>
             </a:pPr>
             <a:r>
-              <a:rPr lang="en-US" sz="2000" dirty="0">
+              <a:rPr lang="en-US" dirty="0">
                 <a:solidFill>
                   <a:schemeClr val="bg1"/>
                 </a:solidFill>
@@ -5630,6 +5630,12 @@
               </a:rPr>
               <a:t>SPRING_PROFILES_ACTIVE: compose</a:t>
             </a:r>
+            <a:endParaRPr lang="en-US" sz="2000" dirty="0">
+              <a:solidFill>
+                <a:schemeClr val="bg1"/>
+              </a:solidFill>
+              <a:latin typeface="Raleway Medium" panose="020B0603030101060003" pitchFamily="34" charset="77"/>
+            </a:endParaRPr>
           </a:p>
           <a:p>
             <a:pPr marL="800100" lvl="1" indent="-342900">
@@ -10427,7 +10433,7 @@
         <p:spPr>
           <a:xfrm>
             <a:off x="1311897" y="1168924"/>
-            <a:ext cx="9398524" cy="5663089"/>
+            <a:ext cx="9398524" cy="5016758"/>
           </a:xfrm>
           <a:prstGeom prst="rect">
             <a:avLst/>
@@ -10620,21 +10626,6 @@
                 <a:latin typeface="Raleway Medium" panose="020B0603030101060003" pitchFamily="34" charset="77"/>
               </a:rPr>
               <a:t>For MongoDB, set up a volume mapping to your hard drive so that the MongoDB pod can be thrown out and not lose orders.</a:t>
-            </a:r>
-          </a:p>
-          <a:p>
-            <a:pPr marL="457200" indent="-457200">
-              <a:buFont typeface="+mj-lt"/>
-              <a:buAutoNum type="arabicPeriod"/>
-            </a:pPr>
-            <a:r>
-              <a:rPr lang="en-US" sz="1600" dirty="0">
-                <a:solidFill>
-                  <a:schemeClr val="bg1"/>
-                </a:solidFill>
-                <a:latin typeface="Raleway Medium" panose="020B0603030101060003" pitchFamily="34" charset="77"/>
-              </a:rPr>
-              <a:t>Once everything is running, release version 2.0 of the UI. Once verified, you’ve realized that there’s a problem (the styling is hideous). Try rolling back.</a:t>
             </a:r>
           </a:p>
           <a:p>
@@ -11049,7 +11040,7 @@
         <p:spPr>
           <a:xfrm>
             <a:off x="1311897" y="1168924"/>
-            <a:ext cx="9398524" cy="5324535"/>
+            <a:ext cx="9398524" cy="4708981"/>
           </a:xfrm>
           <a:prstGeom prst="rect">
             <a:avLst/>
@@ -11107,7 +11098,7 @@
                 </a:solidFill>
                 <a:latin typeface="Raleway Medium" panose="020B0603030101060003" pitchFamily="34" charset="77"/>
               </a:rPr>
-              <a:t>The struggle is where the learning is. You will scratch your head, wonder what’s going on. I have deliberately left out some important information. In some cases I have given bad information. This is designed to mimic real life so that you can troubleshoot, then come to me (the developer) to get the proper information.</a:t>
+              <a:t>The struggle is where the learning is. You will scratch your head, wonder what’s going on. This is designed to mimic real life so that you can troubleshoot, then come to me (the developer) to get the proper information.</a:t>
             </a:r>
           </a:p>
           <a:p>
@@ -11502,7 +11493,7 @@
         <p:spPr>
           <a:xfrm>
             <a:off x="1311897" y="1168924"/>
-            <a:ext cx="9398524" cy="3477875"/>
+            <a:ext cx="9398524" cy="4401205"/>
           </a:xfrm>
           <a:prstGeom prst="rect">
             <a:avLst/>
@@ -11541,17 +11532,10 @@
                 </a:solidFill>
                 <a:latin typeface="Raleway Medium" panose="020B0603030101060003" pitchFamily="34" charset="77"/>
               </a:rPr>
-              <a:t>Pick a service that is the simplest and start there. Implement it, get it running, then move on. Don’t try to just write all the files at once then wonder why things aren’t working. Build from simple to complex in an iterative process. The product API is a good place to start since it just serves static information and has </a:t>
-            </a:r>
-            <a:r>
-              <a:rPr lang="en-US" sz="2000">
-                <a:solidFill>
-                  <a:schemeClr val="bg1"/>
-                </a:solidFill>
-                <a:latin typeface="Raleway Medium" panose="020B0603030101060003" pitchFamily="34" charset="77"/>
-              </a:rPr>
-              <a:t>no dependencies on other services.</a:t>
-            </a:r>
+              <a:t>Pick a service that is the simplest and start there. Implement it, get it running, then move on. Don’t try to just write all the files at once then wonder why things aren’t working. Build from simple to complex in an iterative process. The UI service is a good place to start since it just serves static information and has no dependencies on other services.</a:t>
+            </a:r>
+          </a:p>
+          <a:p>
             <a:endParaRPr lang="en-US" sz="2000" dirty="0">
               <a:solidFill>
                 <a:schemeClr val="bg1"/>
@@ -11560,6 +11544,17 @@
             </a:endParaRPr>
           </a:p>
           <a:p>
+            <a:r>
+              <a:rPr lang="en-US" sz="2000" dirty="0">
+                <a:solidFill>
+                  <a:schemeClr val="bg1"/>
+                </a:solidFill>
+                <a:latin typeface="Raleway Medium" panose="020B0603030101060003" pitchFamily="34" charset="77"/>
+              </a:rPr>
+              <a:t>Save things like fault-tolerance for later. Don’t use multiple copies of a service yet. Don’t add probes. Save that for once it’s working.</a:t>
+            </a:r>
+          </a:p>
+          <a:p>
             <a:endParaRPr lang="en-US" sz="2000" dirty="0">
               <a:solidFill>
                 <a:schemeClr val="bg1"/>
@@ -11575,7 +11570,43 @@
                 </a:solidFill>
                 <a:latin typeface="Raleway Medium" panose="020B0603030101060003" pitchFamily="34" charset="77"/>
               </a:rPr>
-              <a:t>Save things like fault-tolerance for later. Don’t use multiple copies of a service yet. Don’t add probes. Save that for once it’s working.</a:t>
+              <a:t>Don’t forget that you can test services directly by making them </a:t>
+            </a:r>
+            <a:r>
+              <a:rPr lang="en-US" sz="2000" dirty="0" err="1">
+                <a:solidFill>
+                  <a:schemeClr val="bg1"/>
+                </a:solidFill>
+                <a:latin typeface="Raleway Medium" panose="020B0603030101060003" pitchFamily="34" charset="77"/>
+              </a:rPr>
+              <a:t>NodePort</a:t>
+            </a:r>
+            <a:r>
+              <a:rPr lang="en-US" sz="2000" dirty="0">
+                <a:solidFill>
+                  <a:schemeClr val="bg1"/>
+                </a:solidFill>
+                <a:latin typeface="Raleway Medium" panose="020B0603030101060003" pitchFamily="34" charset="77"/>
+              </a:rPr>
+              <a:t>, hitting them from other pods, or using </a:t>
+            </a:r>
+            <a:r>
+              <a:rPr lang="en-US" sz="2000" dirty="0" err="1">
+                <a:solidFill>
+                  <a:schemeClr val="bg1"/>
+                </a:solidFill>
+                <a:latin typeface="Raleway Medium" panose="020B0603030101060003" pitchFamily="34" charset="77"/>
+              </a:rPr>
+              <a:t>kubectl</a:t>
+            </a:r>
+            <a:r>
+              <a:rPr lang="en-US" sz="2000" dirty="0">
+                <a:solidFill>
+                  <a:schemeClr val="bg1"/>
+                </a:solidFill>
+                <a:latin typeface="Raleway Medium" panose="020B0603030101060003" pitchFamily="34" charset="77"/>
+              </a:rPr>
+              <a:t> port-forward.</a:t>
             </a:r>
           </a:p>
         </p:txBody>
@@ -11945,7 +11976,7 @@
         <p:spPr>
           <a:xfrm>
             <a:off x="1311897" y="1168924"/>
-            <a:ext cx="9398524" cy="7201972"/>
+            <a:ext cx="9398524" cy="7571303"/>
           </a:xfrm>
           <a:prstGeom prst="rect">
             <a:avLst/>
@@ -12126,6 +12157,21 @@
                 <a:latin typeface="Raleway Medium" panose="020B0603030101060003" pitchFamily="34" charset="77"/>
               </a:rPr>
               <a:t>&lt;backend&gt;/orders to get order information</a:t>
+            </a:r>
+          </a:p>
+          <a:p>
+            <a:pPr marL="800100" lvl="1" indent="-342900">
+              <a:buFont typeface="Arial" panose="020B0604020202020204" pitchFamily="34" charset="0"/>
+              <a:buChar char="•"/>
+            </a:pPr>
+            <a:r>
+              <a:rPr lang="en-US" sz="2400" dirty="0">
+                <a:solidFill>
+                  <a:schemeClr val="bg1"/>
+                </a:solidFill>
+                <a:latin typeface="Raleway Medium" panose="020B0603030101060003" pitchFamily="34" charset="77"/>
+              </a:rPr>
+              <a:t>&lt;backend&gt;/auth to get auth information</a:t>
             </a:r>
           </a:p>
           <a:p>

</xml_diff>